<commit_message>
Add reports for tasks 5.1, 5.2 and 5.3
</commit_message>
<xml_diff>
--- a/lab_5/task_3/task_3.pptx
+++ b/lab_5/task_3/task_3.pptx
@@ -3306,13 +3306,8 @@
             </a:r>
             <a:r>
               <a:rPr lang="pl-PL" sz="900" dirty="0"/>
-              <a:t> ← </a:t>
-            </a:r>
-            <a:r>
-              <a:rPr lang="pl-PL" sz="900"/>
-              <a:t>pusty słownik</a:t>
-            </a:r>
-            <a:endParaRPr lang="pl-PL" sz="900" dirty="0"/>
+              <a:t> ← pusty słownik</a:t>
+            </a:r>
           </a:p>
           <a:p>
             <a:pPr algn="ctr"/>
@@ -3537,8 +3532,8 @@
         </p:nvSpPr>
         <p:spPr>
           <a:xfrm>
-            <a:off x="8569219" y="5343595"/>
-            <a:ext cx="1856656" cy="430112"/>
+            <a:off x="8468451" y="5397296"/>
+            <a:ext cx="2058192" cy="322710"/>
           </a:xfrm>
           <a:prstGeom prst="flowChartProcess">
             <a:avLst/>
@@ -3565,15 +3560,11 @@
             <a:pPr algn="ctr"/>
             <a:r>
               <a:rPr lang="pl-PL" sz="900" i="1" dirty="0" err="1"/>
-              <a:t>letter</a:t>
-            </a:r>
-            <a:r>
-              <a:rPr lang="pl-PL" sz="900" i="1" dirty="0"/>
-              <a:t> </a:t>
+              <a:t>last_occurrence_table</a:t>
             </a:r>
             <a:r>
               <a:rPr lang="pl-PL" sz="900" dirty="0"/>
-              <a:t>← </a:t>
+              <a:t>[</a:t>
             </a:r>
             <a:r>
               <a:rPr lang="pl-PL" sz="900" i="1" dirty="0" err="1"/>
@@ -3589,27 +3580,7 @@
             </a:r>
             <a:r>
               <a:rPr lang="pl-PL" sz="900" dirty="0"/>
-              <a:t>]</a:t>
-            </a:r>
-            <a:endParaRPr lang="pl-PL" sz="900" i="1" dirty="0"/>
-          </a:p>
-          <a:p>
-            <a:pPr algn="ctr"/>
-            <a:r>
-              <a:rPr lang="pl-PL" sz="900" i="1" dirty="0" err="1"/>
-              <a:t>last_occurrence_table</a:t>
-            </a:r>
-            <a:r>
-              <a:rPr lang="pl-PL" sz="900" dirty="0"/>
-              <a:t>[</a:t>
-            </a:r>
-            <a:r>
-              <a:rPr lang="pl-PL" sz="900" i="1" dirty="0" err="1"/>
-              <a:t>letter</a:t>
-            </a:r>
-            <a:r>
-              <a:rPr lang="pl-PL" sz="900" dirty="0"/>
-              <a:t>] ← i</a:t>
+              <a:t>]] ← i</a:t>
             </a:r>
             <a:br>
               <a:rPr lang="pl-PL" sz="900" dirty="0"/>
@@ -4407,7 +4378,7 @@
         <p:spPr>
           <a:xfrm>
             <a:off x="8216249" y="4994839"/>
-            <a:ext cx="1281298" cy="348756"/>
+            <a:ext cx="1281298" cy="402457"/>
           </a:xfrm>
           <a:prstGeom prst="bentConnector2">
             <a:avLst/>
@@ -4449,14 +4420,14 @@
         </p:nvCxnSpPr>
         <p:spPr>
           <a:xfrm rot="5400000" flipH="1">
-            <a:off x="7979402" y="4255563"/>
-            <a:ext cx="941833" cy="2094456"/>
+            <a:off x="8006253" y="4228712"/>
+            <a:ext cx="888132" cy="2094456"/>
           </a:xfrm>
           <a:prstGeom prst="bentConnector5">
             <a:avLst>
-              <a:gd name="adj1" fmla="val -13934"/>
-              <a:gd name="adj2" fmla="val -50535"/>
-              <a:gd name="adj3" fmla="val 113035"/>
+              <a:gd name="adj1" fmla="val -25739"/>
+              <a:gd name="adj2" fmla="val -56416"/>
+              <a:gd name="adj3" fmla="val 116289"/>
             </a:avLst>
           </a:prstGeom>
           <a:ln>

</xml_diff>